<commit_message>
Before the Ethernet install
</commit_message>
<xml_diff>
--- a/Presentation material/treatment_guidelines_sm.pptx
+++ b/Presentation material/treatment_guidelines_sm.pptx
@@ -7039,7 +7039,7 @@
                   </a:outerShdw>
                 </a:effectLst>
               </a:rPr>
-              <a:t>Sprint Reviews and Retrospectives:</a:t>
+              <a:t>Sprint Retrospectives:</a:t>
             </a:r>
             <a:endParaRPr lang="en-US" b="1" dirty="0">
               <a:effectLst>
@@ -7055,7 +7055,7 @@
             <a:pPr algn="just"/>
             <a:r>
               <a:rPr lang="en-US" dirty="0" smtClean="0"/>
-              <a:t>The Sprint Review is an informal meeting that should feel as a </a:t>
+              <a:t>The Sprint Retrospective is an informal meeting that should feel as a </a:t>
             </a:r>
             <a:r>
               <a:rPr lang="en-US" b="1" dirty="0" smtClean="0"/>
@@ -7063,14 +7063,14 @@
             </a:r>
             <a:r>
               <a:rPr lang="en-US" dirty="0" smtClean="0"/>
-              <a:t> for the completed Sprint. This reward is a privilege that allows them to show off their work and retrospectively learn from experiences.</a:t>
+              <a:t> for the completed Sprint. This reward is a privilege that allows them to retrospectively learn from experiences.</a:t>
             </a:r>
           </a:p>
           <a:p>
             <a:pPr algn="just"/>
             <a:r>
               <a:rPr lang="en-US" dirty="0" smtClean="0"/>
-              <a:t>Unless you face the extreme case of the meeting going over two hours, you do not want to limit their duration. Therefore, do not have it standing. The team must feel comfortable to spend whichever reasonable amount of time they want discussing their procedures and demoing their achievements.</a:t>
+              <a:t>Unless you face the extreme case of the meeting going over two hours, you do not want to limit its duration. Therefore, do not have it standing. The team must feel comfortable to spend whichever reasonable amount of time they want discussing how they did things.</a:t>
             </a:r>
             <a:endParaRPr lang="en-US" dirty="0"/>
           </a:p>

</xml_diff>